<commit_message>
Added start of dissertation prop. presentation ppt
</commit_message>
<xml_diff>
--- a/PropLogSyntaxShortcutsDrawing.pptx
+++ b/PropLogSyntaxShortcutsDrawing.pptx
@@ -7,6 +7,8 @@
   <p:sldIdLst>
     <p:sldId id="256" r:id="rId2"/>
     <p:sldId id="257" r:id="rId3"/>
+    <p:sldId id="258" r:id="rId4"/>
+    <p:sldId id="259" r:id="rId5"/>
   </p:sldIdLst>
   <p:sldSz cx="9144000" cy="6858000" type="screen4x3"/>
   <p:notesSz cx="6858000" cy="9144000"/>
@@ -3315,8 +3317,8 @@
         </p:nvSpPr>
         <p:spPr>
           <a:xfrm>
-            <a:off x="4071696" y="3679152"/>
-            <a:ext cx="838971" cy="230909"/>
+            <a:off x="3893508" y="3679152"/>
+            <a:ext cx="1017160" cy="230909"/>
           </a:xfrm>
           <a:prstGeom prst="rect">
             <a:avLst/>
@@ -3409,8 +3411,8 @@
         </p:nvSpPr>
         <p:spPr>
           <a:xfrm>
-            <a:off x="2370666" y="3679152"/>
-            <a:ext cx="1645613" cy="230909"/>
+            <a:off x="2370667" y="3679152"/>
+            <a:ext cx="1491526" cy="230909"/>
           </a:xfrm>
           <a:prstGeom prst="rect">
             <a:avLst/>
@@ -3501,6 +3503,427 @@
     <p:extLst>
       <p:ext uri="{BB962C8B-B14F-4D97-AF65-F5344CB8AC3E}">
         <p14:creationId xmlns:p14="http://schemas.microsoft.com/office/powerpoint/2010/main" val="3551870512"/>
+      </p:ext>
+    </p:extLst>
+  </p:cSld>
+  <p:clrMapOvr>
+    <a:masterClrMapping/>
+  </p:clrMapOvr>
+</p:sld>
+</file>
+
+<file path=ppt/slides/slide3.xml><?xml version="1.0" encoding="utf-8"?>
+<p:sld xmlns:a="http://schemas.openxmlformats.org/drawingml/2006/main" xmlns:r="http://schemas.openxmlformats.org/officeDocument/2006/relationships" xmlns:p="http://schemas.openxmlformats.org/presentationml/2006/main">
+  <p:cSld>
+    <p:spTree>
+      <p:nvGrpSpPr>
+        <p:cNvPr id="1" name=""/>
+        <p:cNvGrpSpPr/>
+        <p:nvPr/>
+      </p:nvGrpSpPr>
+      <p:grpSpPr>
+        <a:xfrm>
+          <a:off x="0" y="0"/>
+          <a:ext cx="0" cy="0"/>
+          <a:chOff x="0" y="0"/>
+          <a:chExt cx="0" cy="0"/>
+        </a:xfrm>
+      </p:grpSpPr>
+      <p:sp>
+        <p:nvSpPr>
+          <p:cNvPr id="2" name="Title 1"/>
+          <p:cNvSpPr>
+            <a:spLocks noGrp="1"/>
+          </p:cNvSpPr>
+          <p:nvPr>
+            <p:ph type="title"/>
+          </p:nvPr>
+        </p:nvSpPr>
+        <p:spPr/>
+        <p:txBody>
+          <a:bodyPr/>
+          <a:lstStyle/>
+          <a:p>
+            <a:endParaRPr lang="en-US" dirty="0"/>
+          </a:p>
+        </p:txBody>
+      </p:sp>
+      <p:pic>
+        <p:nvPicPr>
+          <p:cNvPr id="4" name="Content Placeholder 3" descr="Screen shot 2013-05-24 at 9.09.33 AM.png"/>
+          <p:cNvPicPr>
+            <a:picLocks noGrp="1" noChangeAspect="1"/>
+          </p:cNvPicPr>
+          <p:nvPr>
+            <p:ph idx="1"/>
+          </p:nvPr>
+        </p:nvPicPr>
+        <p:blipFill>
+          <a:blip r:embed="rId2">
+            <a:extLst>
+              <a:ext uri="{28A0092B-C50C-407E-A947-70E740481C1C}">
+                <a14:useLocalDpi xmlns:a14="http://schemas.microsoft.com/office/drawing/2010/main" val="0"/>
+              </a:ext>
+            </a:extLst>
+          </a:blip>
+          <a:srcRect t="-10190" b="-10190"/>
+          <a:stretch>
+            <a:fillRect/>
+          </a:stretch>
+        </p:blipFill>
+        <p:spPr>
+          <a:xfrm>
+            <a:off x="0" y="1300788"/>
+            <a:ext cx="9292800" cy="5110682"/>
+          </a:xfrm>
+        </p:spPr>
+      </p:pic>
+      <p:sp>
+        <p:nvSpPr>
+          <p:cNvPr id="5" name="Rectangle 4"/>
+          <p:cNvSpPr/>
+          <p:nvPr/>
+        </p:nvSpPr>
+        <p:spPr>
+          <a:xfrm>
+            <a:off x="2883201" y="3679150"/>
+            <a:ext cx="345732" cy="230909"/>
+          </a:xfrm>
+          <a:prstGeom prst="rect">
+            <a:avLst/>
+          </a:prstGeom>
+          <a:solidFill>
+            <a:schemeClr val="accent1">
+              <a:lumMod val="50000"/>
+              <a:alpha val="33000"/>
+            </a:schemeClr>
+          </a:solidFill>
+          <a:ln>
+            <a:noFill/>
+          </a:ln>
+        </p:spPr>
+        <p:style>
+          <a:lnRef idx="1">
+            <a:schemeClr val="accent1"/>
+          </a:lnRef>
+          <a:fillRef idx="3">
+            <a:schemeClr val="accent1"/>
+          </a:fillRef>
+          <a:effectRef idx="2">
+            <a:schemeClr val="accent1"/>
+          </a:effectRef>
+          <a:fontRef idx="minor">
+            <a:schemeClr val="lt1"/>
+          </a:fontRef>
+        </p:style>
+        <p:txBody>
+          <a:bodyPr rtlCol="0" anchor="ctr"/>
+          <a:lstStyle/>
+          <a:p>
+            <a:pPr algn="ctr"/>
+            <a:endParaRPr lang="en-US"/>
+          </a:p>
+        </p:txBody>
+      </p:sp>
+      <p:sp>
+        <p:nvSpPr>
+          <p:cNvPr id="6" name="Rectangle 5"/>
+          <p:cNvSpPr/>
+          <p:nvPr/>
+        </p:nvSpPr>
+        <p:spPr>
+          <a:xfrm>
+            <a:off x="2370667" y="3910059"/>
+            <a:ext cx="1517040" cy="27432"/>
+          </a:xfrm>
+          <a:prstGeom prst="rect">
+            <a:avLst/>
+          </a:prstGeom>
+          <a:solidFill>
+            <a:schemeClr val="accent1">
+              <a:lumMod val="50000"/>
+              <a:alpha val="33000"/>
+            </a:schemeClr>
+          </a:solidFill>
+          <a:ln>
+            <a:noFill/>
+          </a:ln>
+        </p:spPr>
+        <p:style>
+          <a:lnRef idx="1">
+            <a:schemeClr val="accent1"/>
+          </a:lnRef>
+          <a:fillRef idx="3">
+            <a:schemeClr val="accent1"/>
+          </a:fillRef>
+          <a:effectRef idx="2">
+            <a:schemeClr val="accent1"/>
+          </a:effectRef>
+          <a:fontRef idx="minor">
+            <a:schemeClr val="lt1"/>
+          </a:fontRef>
+        </p:style>
+        <p:txBody>
+          <a:bodyPr rtlCol="0" anchor="ctr"/>
+          <a:lstStyle/>
+          <a:p>
+            <a:pPr algn="ctr"/>
+            <a:endParaRPr lang="en-US"/>
+          </a:p>
+        </p:txBody>
+      </p:sp>
+      <p:sp>
+        <p:nvSpPr>
+          <p:cNvPr id="9" name="Rectangle 8"/>
+          <p:cNvSpPr/>
+          <p:nvPr/>
+        </p:nvSpPr>
+        <p:spPr>
+          <a:xfrm>
+            <a:off x="2370667" y="3679152"/>
+            <a:ext cx="454122" cy="230909"/>
+          </a:xfrm>
+          <a:prstGeom prst="rect">
+            <a:avLst/>
+          </a:prstGeom>
+          <a:solidFill>
+            <a:srgbClr val="FFFF00">
+              <a:alpha val="43000"/>
+            </a:srgbClr>
+          </a:solidFill>
+          <a:ln w="25400">
+            <a:solidFill>
+              <a:schemeClr val="tx1"/>
+            </a:solidFill>
+          </a:ln>
+        </p:spPr>
+        <p:style>
+          <a:lnRef idx="1">
+            <a:schemeClr val="accent1"/>
+          </a:lnRef>
+          <a:fillRef idx="3">
+            <a:schemeClr val="accent1"/>
+          </a:fillRef>
+          <a:effectRef idx="2">
+            <a:schemeClr val="accent1"/>
+          </a:effectRef>
+          <a:fontRef idx="minor">
+            <a:schemeClr val="lt1"/>
+          </a:fontRef>
+        </p:style>
+        <p:txBody>
+          <a:bodyPr rtlCol="0" anchor="ctr"/>
+          <a:lstStyle/>
+          <a:p>
+            <a:pPr algn="ctr"/>
+            <a:endParaRPr lang="en-US"/>
+          </a:p>
+        </p:txBody>
+      </p:sp>
+      <p:sp>
+        <p:nvSpPr>
+          <p:cNvPr id="10" name="Rectangle 9"/>
+          <p:cNvSpPr/>
+          <p:nvPr/>
+        </p:nvSpPr>
+        <p:spPr>
+          <a:xfrm>
+            <a:off x="3268050" y="3679150"/>
+            <a:ext cx="594141" cy="230909"/>
+          </a:xfrm>
+          <a:prstGeom prst="rect">
+            <a:avLst/>
+          </a:prstGeom>
+          <a:solidFill>
+            <a:srgbClr val="FFFF00">
+              <a:alpha val="0"/>
+            </a:srgbClr>
+          </a:solidFill>
+          <a:ln w="12700">
+            <a:solidFill>
+              <a:schemeClr val="tx1"/>
+            </a:solidFill>
+          </a:ln>
+        </p:spPr>
+        <p:style>
+          <a:lnRef idx="1">
+            <a:schemeClr val="accent1"/>
+          </a:lnRef>
+          <a:fillRef idx="3">
+            <a:schemeClr val="accent1"/>
+          </a:fillRef>
+          <a:effectRef idx="2">
+            <a:schemeClr val="accent1"/>
+          </a:effectRef>
+          <a:fontRef idx="minor">
+            <a:schemeClr val="lt1"/>
+          </a:fontRef>
+        </p:style>
+        <p:txBody>
+          <a:bodyPr rtlCol="0" anchor="ctr"/>
+          <a:lstStyle/>
+          <a:p>
+            <a:pPr algn="ctr"/>
+            <a:endParaRPr lang="en-US"/>
+          </a:p>
+        </p:txBody>
+      </p:sp>
+    </p:spTree>
+    <p:extLst>
+      <p:ext uri="{BB962C8B-B14F-4D97-AF65-F5344CB8AC3E}">
+        <p14:creationId xmlns:p14="http://schemas.microsoft.com/office/powerpoint/2010/main" val="502190050"/>
+      </p:ext>
+    </p:extLst>
+  </p:cSld>
+  <p:clrMapOvr>
+    <a:masterClrMapping/>
+  </p:clrMapOvr>
+</p:sld>
+</file>
+
+<file path=ppt/slides/slide4.xml><?xml version="1.0" encoding="utf-8"?>
+<p:sld xmlns:a="http://schemas.openxmlformats.org/drawingml/2006/main" xmlns:r="http://schemas.openxmlformats.org/officeDocument/2006/relationships" xmlns:p="http://schemas.openxmlformats.org/presentationml/2006/main">
+  <p:cSld>
+    <p:spTree>
+      <p:nvGrpSpPr>
+        <p:cNvPr id="1" name=""/>
+        <p:cNvGrpSpPr/>
+        <p:nvPr/>
+      </p:nvGrpSpPr>
+      <p:grpSpPr>
+        <a:xfrm>
+          <a:off x="0" y="0"/>
+          <a:ext cx="0" cy="0"/>
+          <a:chOff x="0" y="0"/>
+          <a:chExt cx="0" cy="0"/>
+        </a:xfrm>
+      </p:grpSpPr>
+      <p:sp>
+        <p:nvSpPr>
+          <p:cNvPr id="2" name="Title 1"/>
+          <p:cNvSpPr>
+            <a:spLocks noGrp="1"/>
+          </p:cNvSpPr>
+          <p:nvPr>
+            <p:ph type="title"/>
+          </p:nvPr>
+        </p:nvSpPr>
+        <p:spPr/>
+        <p:txBody>
+          <a:bodyPr/>
+          <a:lstStyle/>
+          <a:p>
+            <a:endParaRPr lang="en-US" dirty="0"/>
+          </a:p>
+        </p:txBody>
+      </p:sp>
+      <p:pic>
+        <p:nvPicPr>
+          <p:cNvPr id="4" name="Content Placeholder 3" descr="Screen shot 2013-07-13 at 10.05.32 AM.png"/>
+          <p:cNvPicPr>
+            <a:picLocks noGrp="1" noChangeAspect="1"/>
+          </p:cNvPicPr>
+          <p:nvPr>
+            <p:ph idx="1"/>
+          </p:nvPr>
+        </p:nvPicPr>
+        <p:blipFill>
+          <a:blip r:embed="rId2">
+            <a:extLst>
+              <a:ext uri="{28A0092B-C50C-407E-A947-70E740481C1C}">
+                <a14:useLocalDpi xmlns:a14="http://schemas.microsoft.com/office/drawing/2010/main" val="0"/>
+              </a:ext>
+            </a:extLst>
+          </a:blip>
+          <a:srcRect t="-8381" b="-8381"/>
+          <a:stretch>
+            <a:fillRect/>
+          </a:stretch>
+        </p:blipFill>
+        <p:spPr/>
+      </p:pic>
+      <p:sp>
+        <p:nvSpPr>
+          <p:cNvPr id="6" name="Rectangle 5"/>
+          <p:cNvSpPr/>
+          <p:nvPr/>
+        </p:nvSpPr>
+        <p:spPr>
+          <a:xfrm>
+            <a:off x="2528213" y="3578478"/>
+            <a:ext cx="308608" cy="244707"/>
+          </a:xfrm>
+          <a:prstGeom prst="rect">
+            <a:avLst/>
+          </a:prstGeom>
+          <a:solidFill>
+            <a:srgbClr val="FF0000">
+              <a:alpha val="65000"/>
+            </a:srgbClr>
+          </a:solidFill>
+          <a:ln w="25400">
+            <a:solidFill>
+              <a:schemeClr val="tx1"/>
+            </a:solidFill>
+          </a:ln>
+        </p:spPr>
+        <p:style>
+          <a:lnRef idx="1">
+            <a:schemeClr val="accent1"/>
+          </a:lnRef>
+          <a:fillRef idx="3">
+            <a:schemeClr val="accent1"/>
+          </a:fillRef>
+          <a:effectRef idx="2">
+            <a:schemeClr val="accent1"/>
+          </a:effectRef>
+          <a:fontRef idx="minor">
+            <a:schemeClr val="lt1"/>
+          </a:fontRef>
+        </p:style>
+        <p:txBody>
+          <a:bodyPr rtlCol="0" anchor="ctr"/>
+          <a:lstStyle/>
+          <a:p>
+            <a:pPr algn="ctr"/>
+            <a:endParaRPr lang="en-US"/>
+          </a:p>
+        </p:txBody>
+      </p:sp>
+      <p:sp>
+        <p:nvSpPr>
+          <p:cNvPr id="5" name="TextBox 4"/>
+          <p:cNvSpPr txBox="1"/>
+          <p:nvPr/>
+        </p:nvSpPr>
+        <p:spPr>
+          <a:xfrm>
+            <a:off x="2528213" y="3513193"/>
+            <a:ext cx="480716" cy="369332"/>
+          </a:xfrm>
+          <a:prstGeom prst="rect">
+            <a:avLst/>
+          </a:prstGeom>
+          <a:noFill/>
+        </p:spPr>
+        <p:txBody>
+          <a:bodyPr wrap="square" rtlCol="0">
+            <a:spAutoFit/>
+          </a:bodyPr>
+          <a:lstStyle/>
+          <a:p>
+            <a:r>
+              <a:rPr lang="en-US" dirty="0" smtClean="0"/>
+              <a:t>?</a:t>
+            </a:r>
+            <a:endParaRPr lang="en-US" dirty="0"/>
+          </a:p>
+        </p:txBody>
+      </p:sp>
+    </p:spTree>
+    <p:extLst>
+      <p:ext uri="{BB962C8B-B14F-4D97-AF65-F5344CB8AC3E}">
+        <p14:creationId xmlns:p14="http://schemas.microsoft.com/office/powerpoint/2010/main" val="492268813"/>
       </p:ext>
     </p:extLst>
   </p:cSld>

</xml_diff>